<commit_message>
Final slide in DD presentation
</commit_message>
<xml_diff>
--- a/OtherStuff/DD final presentation 16_9 v2.pptx
+++ b/OtherStuff/DD final presentation 16_9 v2.pptx
@@ -30,6 +30,7 @@
     <p:sldId id="258" r:id="rId24"/>
     <p:sldId id="256" r:id="rId25"/>
     <p:sldId id="257" r:id="rId26"/>
+    <p:sldId id="282" r:id="rId27"/>
   </p:sldIdLst>
   <p:sldSz cx="9144000" cy="5143500" type="screen16x9"/>
   <p:notesSz cx="6858000" cy="9144000"/>
@@ -14099,6 +14100,312 @@
 </p:sld>
 </file>
 
+<file path=ppt/slides/slide26.xml><?xml version="1.0" encoding="utf-8"?>
+<p:sld xmlns:a="http://schemas.openxmlformats.org/drawingml/2006/main" xmlns:r="http://schemas.openxmlformats.org/officeDocument/2006/relationships" xmlns:p="http://schemas.openxmlformats.org/presentationml/2006/main">
+  <p:cSld>
+    <p:spTree>
+      <p:nvGrpSpPr>
+        <p:cNvPr id="1" name=""/>
+        <p:cNvGrpSpPr/>
+        <p:nvPr/>
+      </p:nvGrpSpPr>
+      <p:grpSpPr>
+        <a:xfrm>
+          <a:off x="0" y="0"/>
+          <a:ext cx="0" cy="0"/>
+          <a:chOff x="0" y="0"/>
+          <a:chExt cx="0" cy="0"/>
+        </a:xfrm>
+      </p:grpSpPr>
+      <p:sp>
+        <p:nvSpPr>
+          <p:cNvPr id="2" name="Titolo 1"/>
+          <p:cNvSpPr>
+            <a:spLocks noGrp="1"/>
+          </p:cNvSpPr>
+          <p:nvPr>
+            <p:ph type="title"/>
+          </p:nvPr>
+        </p:nvSpPr>
+        <p:spPr>
+          <a:xfrm>
+            <a:off x="395536" y="1131590"/>
+            <a:ext cx="8229600" cy="857250"/>
+          </a:xfrm>
+        </p:spPr>
+        <p:txBody>
+          <a:bodyPr>
+            <a:normAutofit fontScale="90000"/>
+          </a:bodyPr>
+          <a:lstStyle/>
+          <a:p>
+            <a:pPr algn="ctr"/>
+            <a:r>
+              <a:rPr lang="en-US" b="1" dirty="0" smtClean="0">
+                <a:latin typeface="Cambria" panose="02040503050406030204" pitchFamily="18" charset="0"/>
+              </a:rPr>
+              <a:t>Thank you for your attention!</a:t>
+            </a:r>
+            <a:endParaRPr lang="en-US" b="1" dirty="0">
+              <a:latin typeface="Cambria" panose="02040503050406030204" pitchFamily="18" charset="0"/>
+            </a:endParaRPr>
+          </a:p>
+        </p:txBody>
+      </p:sp>
+      <p:sp>
+        <p:nvSpPr>
+          <p:cNvPr id="4" name="Titolo 1"/>
+          <p:cNvSpPr txBox="1">
+            <a:spLocks/>
+          </p:cNvSpPr>
+          <p:nvPr/>
+        </p:nvSpPr>
+        <p:spPr>
+          <a:xfrm>
+            <a:off x="467544" y="2499742"/>
+            <a:ext cx="8229600" cy="857250"/>
+          </a:xfrm>
+          <a:prstGeom prst="rect">
+            <a:avLst/>
+          </a:prstGeom>
+        </p:spPr>
+        <p:txBody>
+          <a:bodyPr vert="horz" lIns="0" rIns="0" bIns="0" anchor="b">
+            <a:normAutofit fontScale="97500"/>
+          </a:bodyPr>
+          <a:lstStyle>
+            <a:lvl1pPr algn="l" rtl="0" eaLnBrk="1" latinLnBrk="0" hangingPunct="1">
+              <a:spcBef>
+                <a:spcPct val="0"/>
+              </a:spcBef>
+              <a:buNone/>
+              <a:defRPr kumimoji="0" sz="5000" b="0" kern="1200">
+                <a:ln>
+                  <a:noFill/>
+                </a:ln>
+                <a:solidFill>
+                  <a:schemeClr val="tx2"/>
+                </a:solidFill>
+                <a:effectLst/>
+                <a:latin typeface="+mj-lt"/>
+                <a:ea typeface="+mj-ea"/>
+                <a:cs typeface="+mj-cs"/>
+              </a:defRPr>
+            </a:lvl1pPr>
+          </a:lstStyle>
+          <a:p>
+            <a:pPr algn="ctr"/>
+            <a:r>
+              <a:rPr lang="en-US" b="1" dirty="0" smtClean="0">
+                <a:latin typeface="Cambria" panose="02040503050406030204" pitchFamily="18" charset="0"/>
+              </a:rPr>
+              <a:t>Questions?</a:t>
+            </a:r>
+            <a:endParaRPr lang="en-US" b="1" dirty="0">
+              <a:latin typeface="Cambria" panose="02040503050406030204" pitchFamily="18" charset="0"/>
+            </a:endParaRPr>
+          </a:p>
+        </p:txBody>
+      </p:sp>
+    </p:spTree>
+    <p:extLst>
+      <p:ext uri="{BB962C8B-B14F-4D97-AF65-F5344CB8AC3E}">
+        <p14:creationId xmlns:p14="http://schemas.microsoft.com/office/powerpoint/2010/main" val="3617237446"/>
+      </p:ext>
+    </p:extLst>
+  </p:cSld>
+  <p:clrMapOvr>
+    <a:masterClrMapping/>
+  </p:clrMapOvr>
+  <p:timing>
+    <p:tnLst>
+      <p:par>
+        <p:cTn id="1" dur="indefinite" restart="never" nodeType="tmRoot">
+          <p:childTnLst>
+            <p:seq concurrent="1" nextAc="seek">
+              <p:cTn id="2" dur="indefinite" nodeType="mainSeq">
+                <p:childTnLst>
+                  <p:par>
+                    <p:cTn id="3" fill="hold">
+                      <p:stCondLst>
+                        <p:cond delay="indefinite"/>
+                      </p:stCondLst>
+                      <p:childTnLst>
+                        <p:par>
+                          <p:cTn id="4" fill="hold">
+                            <p:stCondLst>
+                              <p:cond delay="0"/>
+                            </p:stCondLst>
+                            <p:childTnLst>
+                              <p:par>
+                                <p:cTn id="5" presetID="10" presetClass="entr" presetSubtype="0" fill="hold" grpId="0" nodeType="clickEffect">
+                                  <p:stCondLst>
+                                    <p:cond delay="0"/>
+                                  </p:stCondLst>
+                                  <p:childTnLst>
+                                    <p:set>
+                                      <p:cBhvr>
+                                        <p:cTn id="6" dur="1" fill="hold">
+                                          <p:stCondLst>
+                                            <p:cond delay="0"/>
+                                          </p:stCondLst>
+                                        </p:cTn>
+                                        <p:tgtEl>
+                                          <p:spTgt spid="2"/>
+                                        </p:tgtEl>
+                                        <p:attrNameLst>
+                                          <p:attrName>style.visibility</p:attrName>
+                                        </p:attrNameLst>
+                                      </p:cBhvr>
+                                      <p:to>
+                                        <p:strVal val="visible"/>
+                                      </p:to>
+                                    </p:set>
+                                    <p:animEffect transition="in" filter="fade">
+                                      <p:cBhvr>
+                                        <p:cTn id="7" dur="500"/>
+                                        <p:tgtEl>
+                                          <p:spTgt spid="2"/>
+                                        </p:tgtEl>
+                                      </p:cBhvr>
+                                    </p:animEffect>
+                                  </p:childTnLst>
+                                </p:cTn>
+                              </p:par>
+                            </p:childTnLst>
+                          </p:cTn>
+                        </p:par>
+                      </p:childTnLst>
+                    </p:cTn>
+                  </p:par>
+                  <p:par>
+                    <p:cTn id="8" fill="hold">
+                      <p:stCondLst>
+                        <p:cond delay="indefinite"/>
+                      </p:stCondLst>
+                      <p:childTnLst>
+                        <p:par>
+                          <p:cTn id="9" fill="hold">
+                            <p:stCondLst>
+                              <p:cond delay="0"/>
+                            </p:stCondLst>
+                            <p:childTnLst>
+                              <p:par>
+                                <p:cTn id="10" presetID="42" presetClass="entr" presetSubtype="0" fill="hold" grpId="0" nodeType="clickEffect">
+                                  <p:stCondLst>
+                                    <p:cond delay="0"/>
+                                  </p:stCondLst>
+                                  <p:childTnLst>
+                                    <p:set>
+                                      <p:cBhvr>
+                                        <p:cTn id="11" dur="1" fill="hold">
+                                          <p:stCondLst>
+                                            <p:cond delay="0"/>
+                                          </p:stCondLst>
+                                        </p:cTn>
+                                        <p:tgtEl>
+                                          <p:spTgt spid="4"/>
+                                        </p:tgtEl>
+                                        <p:attrNameLst>
+                                          <p:attrName>style.visibility</p:attrName>
+                                        </p:attrNameLst>
+                                      </p:cBhvr>
+                                      <p:to>
+                                        <p:strVal val="visible"/>
+                                      </p:to>
+                                    </p:set>
+                                    <p:animEffect transition="in" filter="fade">
+                                      <p:cBhvr>
+                                        <p:cTn id="12" dur="1000"/>
+                                        <p:tgtEl>
+                                          <p:spTgt spid="4"/>
+                                        </p:tgtEl>
+                                      </p:cBhvr>
+                                    </p:animEffect>
+                                    <p:anim calcmode="lin" valueType="num">
+                                      <p:cBhvr>
+                                        <p:cTn id="13" dur="1000" fill="hold"/>
+                                        <p:tgtEl>
+                                          <p:spTgt spid="4"/>
+                                        </p:tgtEl>
+                                        <p:attrNameLst>
+                                          <p:attrName>ppt_x</p:attrName>
+                                        </p:attrNameLst>
+                                      </p:cBhvr>
+                                      <p:tavLst>
+                                        <p:tav tm="0">
+                                          <p:val>
+                                            <p:strVal val="#ppt_x"/>
+                                          </p:val>
+                                        </p:tav>
+                                        <p:tav tm="100000">
+                                          <p:val>
+                                            <p:strVal val="#ppt_x"/>
+                                          </p:val>
+                                        </p:tav>
+                                      </p:tavLst>
+                                    </p:anim>
+                                    <p:anim calcmode="lin" valueType="num">
+                                      <p:cBhvr>
+                                        <p:cTn id="14" dur="1000" fill="hold"/>
+                                        <p:tgtEl>
+                                          <p:spTgt spid="4"/>
+                                        </p:tgtEl>
+                                        <p:attrNameLst>
+                                          <p:attrName>ppt_y</p:attrName>
+                                        </p:attrNameLst>
+                                      </p:cBhvr>
+                                      <p:tavLst>
+                                        <p:tav tm="0">
+                                          <p:val>
+                                            <p:strVal val="#ppt_y+.1"/>
+                                          </p:val>
+                                        </p:tav>
+                                        <p:tav tm="100000">
+                                          <p:val>
+                                            <p:strVal val="#ppt_y"/>
+                                          </p:val>
+                                        </p:tav>
+                                      </p:tavLst>
+                                    </p:anim>
+                                  </p:childTnLst>
+                                </p:cTn>
+                              </p:par>
+                            </p:childTnLst>
+                          </p:cTn>
+                        </p:par>
+                      </p:childTnLst>
+                    </p:cTn>
+                  </p:par>
+                </p:childTnLst>
+              </p:cTn>
+              <p:prevCondLst>
+                <p:cond evt="onPrev" delay="0">
+                  <p:tgtEl>
+                    <p:sldTgt/>
+                  </p:tgtEl>
+                </p:cond>
+              </p:prevCondLst>
+              <p:nextCondLst>
+                <p:cond evt="onNext" delay="0">
+                  <p:tgtEl>
+                    <p:sldTgt/>
+                  </p:tgtEl>
+                </p:cond>
+              </p:nextCondLst>
+            </p:seq>
+          </p:childTnLst>
+        </p:cTn>
+      </p:par>
+    </p:tnLst>
+    <p:bldLst>
+      <p:bldP spid="2" grpId="0"/>
+      <p:bldP spid="4" grpId="0"/>
+    </p:bldLst>
+  </p:timing>
+</p:sld>
+</file>
+
 <file path=ppt/slides/slide3.xml><?xml version="1.0" encoding="utf-8"?>
 <p:sld xmlns:a="http://schemas.openxmlformats.org/drawingml/2006/main" xmlns:r="http://schemas.openxmlformats.org/officeDocument/2006/relationships" xmlns:p="http://schemas.openxmlformats.org/presentationml/2006/main">
   <p:cSld>

</xml_diff>

<commit_message>
DD presentation error fix
</commit_message>
<xml_diff>
--- a/OtherStuff/DD final presentation 16_9 v2.pptx
+++ b/OtherStuff/DD final presentation 16_9 v2.pptx
@@ -131,7 +131,7 @@
   </p:defaultTextStyle>
   <p:extLst>
     <p:ext uri="{EFAFB233-063F-42B5-8137-9DF3F51BA10A}">
-      <p15:sldGuideLst xmlns:p15="http://schemas.microsoft.com/office/powerpoint/2012/main" xmlns="">
+      <p15:sldGuideLst xmlns:p15="http://schemas.microsoft.com/office/powerpoint/2012/main">
         <p15:guide id="1" orient="horz" pos="1620">
           <p15:clr>
             <a:srgbClr val="A4A3A4"/>
@@ -9675,7 +9675,7 @@
         </p:nvSpPr>
         <p:spPr>
           <a:xfrm>
-            <a:off x="3095897" y="2983337"/>
+            <a:off x="3095897" y="3185894"/>
             <a:ext cx="2632166" cy="287383"/>
           </a:xfrm>
           <a:prstGeom prst="rightArrow">
@@ -9808,6 +9808,46 @@
           </a:p>
         </p:txBody>
       </p:sp>
+      <p:sp>
+        <p:nvSpPr>
+          <p:cNvPr id="17" name="Freccia a destra 16"/>
+          <p:cNvSpPr/>
+          <p:nvPr/>
+        </p:nvSpPr>
+        <p:spPr>
+          <a:xfrm rot="21062330">
+            <a:off x="3089579" y="2695265"/>
+            <a:ext cx="2632166" cy="287383"/>
+          </a:xfrm>
+          <a:prstGeom prst="rightArrow">
+            <a:avLst/>
+          </a:prstGeom>
+        </p:spPr>
+        <p:style>
+          <a:lnRef idx="2">
+            <a:schemeClr val="accent1">
+              <a:shade val="50000"/>
+            </a:schemeClr>
+          </a:lnRef>
+          <a:fillRef idx="1">
+            <a:schemeClr val="accent1"/>
+          </a:fillRef>
+          <a:effectRef idx="0">
+            <a:schemeClr val="accent1"/>
+          </a:effectRef>
+          <a:fontRef idx="minor">
+            <a:schemeClr val="lt1"/>
+          </a:fontRef>
+        </p:style>
+        <p:txBody>
+          <a:bodyPr rtlCol="0" anchor="ctr"/>
+          <a:lstStyle/>
+          <a:p>
+            <a:pPr algn="ctr"/>
+            <a:endParaRPr lang="en-US" sz="1350"/>
+          </a:p>
+        </p:txBody>
+      </p:sp>
     </p:spTree>
     <p:extLst>
       <p:ext uri="{BB962C8B-B14F-4D97-AF65-F5344CB8AC3E}">
@@ -10152,7 +10192,7 @@
                                           </p:stCondLst>
                                         </p:cTn>
                                         <p:tgtEl>
-                                          <p:spTgt spid="7"/>
+                                          <p:spTgt spid="17"/>
                                         </p:tgtEl>
                                         <p:attrNameLst>
                                           <p:attrName>style.visibility</p:attrName>
@@ -10166,7 +10206,7 @@
                                       <p:cBhvr>
                                         <p:cTn id="35" dur="500"/>
                                         <p:tgtEl>
-                                          <p:spTgt spid="7"/>
+                                          <p:spTgt spid="17"/>
                                         </p:tgtEl>
                                       </p:cBhvr>
                                     </p:animEffect>
@@ -10205,7 +10245,7 @@
                                           </p:stCondLst>
                                         </p:cTn>
                                         <p:tgtEl>
-                                          <p:spTgt spid="15"/>
+                                          <p:spTgt spid="7"/>
                                         </p:tgtEl>
                                         <p:attrNameLst>
                                           <p:attrName>style.visibility</p:attrName>
@@ -10219,42 +10259,7 @@
                                       <p:cBhvr>
                                         <p:cTn id="40" dur="500"/>
                                         <p:tgtEl>
-                                          <p:spTgt spid="15"/>
-                                        </p:tgtEl>
-                                      </p:cBhvr>
-                                    </p:animEffect>
-                                  </p:childTnLst>
-                                </p:cTn>
-                              </p:par>
-                              <p:par>
-                                <p:cTn id="41" presetID="10" presetClass="entr" presetSubtype="0" fill="hold" grpId="0" nodeType="withEffect">
-                                  <p:stCondLst>
-                                    <p:cond delay="0"/>
-                                  </p:stCondLst>
-                                  <p:childTnLst>
-                                    <p:set>
-                                      <p:cBhvr>
-                                        <p:cTn id="42" dur="1" fill="hold">
-                                          <p:stCondLst>
-                                            <p:cond delay="0"/>
-                                          </p:stCondLst>
-                                        </p:cTn>
-                                        <p:tgtEl>
-                                          <p:spTgt spid="14"/>
-                                        </p:tgtEl>
-                                        <p:attrNameLst>
-                                          <p:attrName>style.visibility</p:attrName>
-                                        </p:attrNameLst>
-                                      </p:cBhvr>
-                                      <p:to>
-                                        <p:strVal val="visible"/>
-                                      </p:to>
-                                    </p:set>
-                                    <p:animEffect transition="in" filter="fade">
-                                      <p:cBhvr>
-                                        <p:cTn id="43" dur="500"/>
-                                        <p:tgtEl>
-                                          <p:spTgt spid="14"/>
+                                          <p:spTgt spid="7"/>
                                         </p:tgtEl>
                                       </p:cBhvr>
                                     </p:animEffect>
@@ -10268,32 +10273,67 @@
                     </p:cTn>
                   </p:par>
                   <p:par>
-                    <p:cTn id="44" fill="hold">
+                    <p:cTn id="41" fill="hold">
                       <p:stCondLst>
                         <p:cond delay="indefinite"/>
                       </p:stCondLst>
                       <p:childTnLst>
                         <p:par>
-                          <p:cTn id="45" fill="hold">
+                          <p:cTn id="42" fill="hold">
                             <p:stCondLst>
                               <p:cond delay="0"/>
                             </p:stCondLst>
                             <p:childTnLst>
                               <p:par>
-                                <p:cTn id="46" presetID="10" presetClass="entr" presetSubtype="0" fill="hold" grpId="0" nodeType="clickEffect">
+                                <p:cTn id="43" presetID="10" presetClass="entr" presetSubtype="0" fill="hold" grpId="0" nodeType="clickEffect">
                                   <p:stCondLst>
                                     <p:cond delay="0"/>
                                   </p:stCondLst>
                                   <p:childTnLst>
                                     <p:set>
                                       <p:cBhvr>
+                                        <p:cTn id="44" dur="1" fill="hold">
+                                          <p:stCondLst>
+                                            <p:cond delay="0"/>
+                                          </p:stCondLst>
+                                        </p:cTn>
+                                        <p:tgtEl>
+                                          <p:spTgt spid="14"/>
+                                        </p:tgtEl>
+                                        <p:attrNameLst>
+                                          <p:attrName>style.visibility</p:attrName>
+                                        </p:attrNameLst>
+                                      </p:cBhvr>
+                                      <p:to>
+                                        <p:strVal val="visible"/>
+                                      </p:to>
+                                    </p:set>
+                                    <p:animEffect transition="in" filter="fade">
+                                      <p:cBhvr>
+                                        <p:cTn id="45" dur="500"/>
+                                        <p:tgtEl>
+                                          <p:spTgt spid="14"/>
+                                        </p:tgtEl>
+                                      </p:cBhvr>
+                                    </p:animEffect>
+                                  </p:childTnLst>
+                                </p:cTn>
+                              </p:par>
+                              <p:par>
+                                <p:cTn id="46" presetID="10" presetClass="entr" presetSubtype="0" fill="hold" grpId="0" nodeType="withEffect">
+                                  <p:stCondLst>
+                                    <p:cond delay="0"/>
+                                  </p:stCondLst>
+                                  <p:childTnLst>
+                                    <p:set>
+                                      <p:cBhvr>
                                         <p:cTn id="47" dur="1" fill="hold">
                                           <p:stCondLst>
                                             <p:cond delay="0"/>
                                           </p:stCondLst>
                                         </p:cTn>
                                         <p:tgtEl>
-                                          <p:spTgt spid="16"/>
+                                          <p:spTgt spid="15"/>
                                         </p:tgtEl>
                                         <p:attrNameLst>
                                           <p:attrName>style.visibility</p:attrName>
@@ -10306,6 +10346,59 @@
                                     <p:animEffect transition="in" filter="fade">
                                       <p:cBhvr>
                                         <p:cTn id="48" dur="500"/>
+                                        <p:tgtEl>
+                                          <p:spTgt spid="15"/>
+                                        </p:tgtEl>
+                                      </p:cBhvr>
+                                    </p:animEffect>
+                                  </p:childTnLst>
+                                </p:cTn>
+                              </p:par>
+                            </p:childTnLst>
+                          </p:cTn>
+                        </p:par>
+                      </p:childTnLst>
+                    </p:cTn>
+                  </p:par>
+                  <p:par>
+                    <p:cTn id="49" fill="hold">
+                      <p:stCondLst>
+                        <p:cond delay="indefinite"/>
+                      </p:stCondLst>
+                      <p:childTnLst>
+                        <p:par>
+                          <p:cTn id="50" fill="hold">
+                            <p:stCondLst>
+                              <p:cond delay="0"/>
+                            </p:stCondLst>
+                            <p:childTnLst>
+                              <p:par>
+                                <p:cTn id="51" presetID="10" presetClass="entr" presetSubtype="0" fill="hold" grpId="0" nodeType="clickEffect">
+                                  <p:stCondLst>
+                                    <p:cond delay="0"/>
+                                  </p:stCondLst>
+                                  <p:childTnLst>
+                                    <p:set>
+                                      <p:cBhvr>
+                                        <p:cTn id="52" dur="1" fill="hold">
+                                          <p:stCondLst>
+                                            <p:cond delay="0"/>
+                                          </p:stCondLst>
+                                        </p:cTn>
+                                        <p:tgtEl>
+                                          <p:spTgt spid="16"/>
+                                        </p:tgtEl>
+                                        <p:attrNameLst>
+                                          <p:attrName>style.visibility</p:attrName>
+                                        </p:attrNameLst>
+                                      </p:cBhvr>
+                                      <p:to>
+                                        <p:strVal val="visible"/>
+                                      </p:to>
+                                    </p:set>
+                                    <p:animEffect transition="in" filter="fade">
+                                      <p:cBhvr>
+                                        <p:cTn id="53" dur="500"/>
                                         <p:tgtEl>
                                           <p:spTgt spid="16"/>
                                         </p:tgtEl>
@@ -10352,6 +10445,7 @@
       <p:bldP spid="14" grpId="0" animBg="1"/>
       <p:bldP spid="15" grpId="0" animBg="1"/>
       <p:bldP spid="16" grpId="0" animBg="1"/>
+      <p:bldP spid="17" grpId="0" animBg="1"/>
     </p:bldLst>
   </p:timing>
 </p:sld>
@@ -15660,10 +15754,22 @@
               <a:buChar char="•"/>
             </a:pPr>
             <a:r>
+              <a:rPr lang="en-US" sz="1500" smtClean="0">
+                <a:latin typeface="Cambria" panose="02040503050406030204" pitchFamily="18" charset="0"/>
+              </a:rPr>
+              <a:t>Contains </a:t>
+            </a:r>
+            <a:r>
+              <a:rPr lang="en-US" sz="1500" smtClean="0">
+                <a:latin typeface="Cambria" panose="02040503050406030204" pitchFamily="18" charset="0"/>
+              </a:rPr>
+              <a:t>the </a:t>
+            </a:r>
+            <a:r>
               <a:rPr lang="en-US" sz="1500" dirty="0">
                 <a:latin typeface="Cambria" panose="02040503050406030204" pitchFamily="18" charset="0"/>
               </a:rPr>
-              <a:t>Provides access to the business logic</a:t>
+              <a:t>business logic</a:t>
             </a:r>
           </a:p>
           <a:p>

</xml_diff>